<commit_message>
add python png to presentation
</commit_message>
<xml_diff>
--- a/presentation.pptx
+++ b/presentation.pptx
@@ -5,7 +5,7 @@
     <p:sldMasterId id="2147483960" r:id="rId1"/>
   </p:sldMasterIdLst>
   <p:notesMasterIdLst>
-    <p:notesMasterId r:id="rId11"/>
+    <p:notesMasterId r:id="rId12"/>
   </p:notesMasterIdLst>
   <p:sldIdLst>
     <p:sldId id="256" r:id="rId2"/>
@@ -13,10 +13,11 @@
     <p:sldId id="258" r:id="rId4"/>
     <p:sldId id="259" r:id="rId5"/>
     <p:sldId id="260" r:id="rId6"/>
-    <p:sldId id="261" r:id="rId7"/>
-    <p:sldId id="262" r:id="rId8"/>
-    <p:sldId id="263" r:id="rId9"/>
-    <p:sldId id="264" r:id="rId10"/>
+    <p:sldId id="265" r:id="rId7"/>
+    <p:sldId id="261" r:id="rId8"/>
+    <p:sldId id="262" r:id="rId9"/>
+    <p:sldId id="263" r:id="rId10"/>
+    <p:sldId id="264" r:id="rId11"/>
   </p:sldIdLst>
   <p:sldSz cx="9144000" cy="6858000" type="screen4x3"/>
   <p:notesSz cx="6858000" cy="9144000"/>
@@ -125,6 +126,7 @@
             <p14:sldId id="258"/>
             <p14:sldId id="259"/>
             <p14:sldId id="260"/>
+            <p14:sldId id="265"/>
             <p14:sldId id="261"/>
             <p14:sldId id="262"/>
             <p14:sldId id="263"/>
@@ -3888,6 +3890,125 @@
 </p:sld>
 </file>
 
+<file path=ppt/slides/slide10.xml><?xml version="1.0" encoding="utf-8"?>
+<p:sld xmlns:a="http://schemas.openxmlformats.org/drawingml/2006/main" xmlns:r="http://schemas.openxmlformats.org/officeDocument/2006/relationships" xmlns:p="http://schemas.openxmlformats.org/presentationml/2006/main">
+  <p:cSld>
+    <p:spTree>
+      <p:nvGrpSpPr>
+        <p:cNvPr id="1" name=""/>
+        <p:cNvGrpSpPr/>
+        <p:nvPr/>
+      </p:nvGrpSpPr>
+      <p:grpSpPr>
+        <a:xfrm>
+          <a:off x="0" y="0"/>
+          <a:ext cx="0" cy="0"/>
+          <a:chOff x="0" y="0"/>
+          <a:chExt cx="0" cy="0"/>
+        </a:xfrm>
+      </p:grpSpPr>
+      <p:sp>
+        <p:nvSpPr>
+          <p:cNvPr id="2" name="Title 1"/>
+          <p:cNvSpPr>
+            <a:spLocks noGrp="1"/>
+          </p:cNvSpPr>
+          <p:nvPr>
+            <p:ph type="title"/>
+          </p:nvPr>
+        </p:nvSpPr>
+        <p:spPr/>
+        <p:txBody>
+          <a:bodyPr/>
+          <a:lstStyle/>
+          <a:p>
+            <a:r>
+              <a:rPr lang="en-US" dirty="0" smtClean="0"/>
+              <a:t>Results</a:t>
+            </a:r>
+            <a:endParaRPr lang="en-US" dirty="0"/>
+          </a:p>
+        </p:txBody>
+      </p:sp>
+      <p:pic>
+        <p:nvPicPr>
+          <p:cNvPr id="4" name="Picture 3" descr="Screen Shot 2016-05-03 at 3.02.27 PM.png"/>
+          <p:cNvPicPr>
+            <a:picLocks noChangeAspect="1"/>
+          </p:cNvPicPr>
+          <p:nvPr/>
+        </p:nvPicPr>
+        <p:blipFill>
+          <a:blip r:embed="rId2">
+            <a:extLst>
+              <a:ext uri="{28A0092B-C50C-407E-A947-70E740481C1C}">
+                <a14:useLocalDpi xmlns:a14="http://schemas.microsoft.com/office/drawing/2010/main" val="0"/>
+              </a:ext>
+            </a:extLst>
+          </a:blip>
+          <a:stretch>
+            <a:fillRect/>
+          </a:stretch>
+        </p:blipFill>
+        <p:spPr>
+          <a:xfrm>
+            <a:off x="0" y="2637378"/>
+            <a:ext cx="9144000" cy="3337425"/>
+          </a:xfrm>
+          <a:prstGeom prst="rect">
+            <a:avLst/>
+          </a:prstGeom>
+        </p:spPr>
+      </p:pic>
+      <p:sp>
+        <p:nvSpPr>
+          <p:cNvPr id="5" name="TextBox 4"/>
+          <p:cNvSpPr txBox="1"/>
+          <p:nvPr/>
+        </p:nvSpPr>
+        <p:spPr>
+          <a:xfrm>
+            <a:off x="457199" y="1535442"/>
+            <a:ext cx="5224983" cy="523220"/>
+          </a:xfrm>
+          <a:prstGeom prst="rect">
+            <a:avLst/>
+          </a:prstGeom>
+          <a:noFill/>
+        </p:spPr>
+        <p:txBody>
+          <a:bodyPr wrap="square" rtlCol="0">
+            <a:spAutoFit/>
+          </a:bodyPr>
+          <a:lstStyle/>
+          <a:p>
+            <a:r>
+              <a:rPr lang="en-US" sz="2800" dirty="0" smtClean="0"/>
+              <a:t>Neural Network Performance</a:t>
+            </a:r>
+          </a:p>
+        </p:txBody>
+      </p:sp>
+    </p:spTree>
+    <p:extLst>
+      <p:ext uri="{BB962C8B-B14F-4D97-AF65-F5344CB8AC3E}">
+        <p14:creationId xmlns:p14="http://schemas.microsoft.com/office/powerpoint/2010/main" val="3568103725"/>
+      </p:ext>
+    </p:extLst>
+  </p:cSld>
+  <p:clrMapOvr>
+    <a:masterClrMapping/>
+  </p:clrMapOvr>
+  <p:timing>
+    <p:tnLst>
+      <p:par>
+        <p:cTn xmlns:p14="http://schemas.microsoft.com/office/powerpoint/2010/main" id="1" dur="indefinite" restart="never" nodeType="tmRoot"/>
+      </p:par>
+    </p:tnLst>
+  </p:timing>
+</p:sld>
+</file>
+
 <file path=ppt/slides/slide2.xml><?xml version="1.0" encoding="utf-8"?>
 <p:sld xmlns:a="http://schemas.openxmlformats.org/drawingml/2006/main" xmlns:r="http://schemas.openxmlformats.org/officeDocument/2006/relationships" xmlns:p="http://schemas.openxmlformats.org/presentationml/2006/main">
   <p:cSld>
@@ -4457,6 +4578,228 @@
 </file>
 
 <file path=ppt/slides/slide6.xml><?xml version="1.0" encoding="utf-8"?>
+<p:sld xmlns:a="http://schemas.openxmlformats.org/drawingml/2006/main" xmlns:r="http://schemas.openxmlformats.org/officeDocument/2006/relationships" xmlns:p="http://schemas.openxmlformats.org/presentationml/2006/main">
+  <p:cSld>
+    <p:spTree>
+      <p:nvGrpSpPr>
+        <p:cNvPr id="1" name=""/>
+        <p:cNvGrpSpPr/>
+        <p:nvPr/>
+      </p:nvGrpSpPr>
+      <p:grpSpPr>
+        <a:xfrm>
+          <a:off x="0" y="0"/>
+          <a:ext cx="0" cy="0"/>
+          <a:chOff x="0" y="0"/>
+          <a:chExt cx="0" cy="0"/>
+        </a:xfrm>
+      </p:grpSpPr>
+      <p:sp>
+        <p:nvSpPr>
+          <p:cNvPr id="2" name="Title 1"/>
+          <p:cNvSpPr>
+            <a:spLocks noGrp="1"/>
+          </p:cNvSpPr>
+          <p:nvPr>
+            <p:ph type="title"/>
+          </p:nvPr>
+        </p:nvSpPr>
+        <p:spPr/>
+        <p:txBody>
+          <a:bodyPr/>
+          <a:lstStyle/>
+          <a:p>
+            <a:r>
+              <a:rPr lang="en-US" dirty="0" smtClean="0"/>
+              <a:t>Feature Generation</a:t>
+            </a:r>
+            <a:endParaRPr lang="en-US" dirty="0"/>
+          </a:p>
+        </p:txBody>
+      </p:sp>
+      <p:sp>
+        <p:nvSpPr>
+          <p:cNvPr id="3" name="Content Placeholder 2"/>
+          <p:cNvSpPr>
+            <a:spLocks noGrp="1"/>
+          </p:cNvSpPr>
+          <p:nvPr>
+            <p:ph idx="1"/>
+          </p:nvPr>
+        </p:nvSpPr>
+        <p:spPr/>
+        <p:txBody>
+          <a:bodyPr/>
+          <a:lstStyle/>
+          <a:p>
+            <a:r>
+              <a:rPr lang="en-US" dirty="0" smtClean="0"/>
+              <a:t>Counted the number of words in a query</a:t>
+            </a:r>
+          </a:p>
+          <a:p>
+            <a:r>
+              <a:rPr lang="en-US" dirty="0" smtClean="0"/>
+              <a:t>Number of characters</a:t>
+            </a:r>
+          </a:p>
+          <a:p>
+            <a:r>
+              <a:rPr lang="en-US" dirty="0" smtClean="0"/>
+              <a:t>Number of characters per word</a:t>
+            </a:r>
+          </a:p>
+          <a:p>
+            <a:r>
+              <a:rPr lang="en-US" dirty="0" smtClean="0"/>
+              <a:t>Number of nouns</a:t>
+            </a:r>
+          </a:p>
+          <a:p>
+            <a:r>
+              <a:rPr lang="en-US" dirty="0" smtClean="0"/>
+              <a:t>Number of prepositions</a:t>
+            </a:r>
+          </a:p>
+          <a:p>
+            <a:r>
+              <a:rPr lang="en-US" dirty="0" smtClean="0"/>
+              <a:t>Number of verbs</a:t>
+            </a:r>
+          </a:p>
+          <a:p>
+            <a:r>
+              <a:rPr lang="en-US" dirty="0" smtClean="0"/>
+              <a:t>Whether or not the query contained a number</a:t>
+            </a:r>
+          </a:p>
+          <a:p>
+            <a:endParaRPr lang="en-US" dirty="0"/>
+          </a:p>
+          <a:p>
+            <a:pPr marL="0" indent="0">
+              <a:buNone/>
+            </a:pPr>
+            <a:r>
+              <a:rPr lang="en-US" dirty="0" smtClean="0"/>
+              <a:t>Libraries: </a:t>
+            </a:r>
+            <a:r>
+              <a:rPr lang="en-US" dirty="0" smtClean="0">
+                <a:latin typeface="Andale Mono"/>
+                <a:cs typeface="Andale Mono"/>
+              </a:rPr>
+              <a:t>pandas, </a:t>
+            </a:r>
+            <a:r>
+              <a:rPr lang="en-US" dirty="0" err="1" smtClean="0">
+                <a:latin typeface="Andale Mono"/>
+                <a:cs typeface="Andale Mono"/>
+              </a:rPr>
+              <a:t>numpy</a:t>
+            </a:r>
+            <a:r>
+              <a:rPr lang="en-US" dirty="0" smtClean="0">
+                <a:latin typeface="Andale Mono"/>
+                <a:cs typeface="Andale Mono"/>
+              </a:rPr>
+              <a:t>, re, </a:t>
+            </a:r>
+            <a:r>
+              <a:rPr lang="en-US" dirty="0" err="1" smtClean="0">
+                <a:latin typeface="Andale Mono"/>
+                <a:cs typeface="Andale Mono"/>
+              </a:rPr>
+              <a:t>nltk</a:t>
+            </a:r>
+            <a:endParaRPr lang="en-US" dirty="0">
+              <a:latin typeface="Andale Mono"/>
+              <a:cs typeface="Andale Mono"/>
+            </a:endParaRPr>
+          </a:p>
+        </p:txBody>
+      </p:sp>
+      <p:pic>
+        <p:nvPicPr>
+          <p:cNvPr id="4" name="Picture 3" descr="imgres.jpg"/>
+          <p:cNvPicPr>
+            <a:picLocks noChangeAspect="1"/>
+          </p:cNvPicPr>
+          <p:nvPr/>
+        </p:nvPicPr>
+        <p:blipFill>
+          <a:blip r:embed="rId2">
+            <a:extLst>
+              <a:ext uri="{28A0092B-C50C-407E-A947-70E740481C1C}">
+                <a14:useLocalDpi xmlns:a14="http://schemas.microsoft.com/office/drawing/2010/main" val="0"/>
+              </a:ext>
+            </a:extLst>
+          </a:blip>
+          <a:stretch>
+            <a:fillRect/>
+          </a:stretch>
+        </p:blipFill>
+        <p:spPr>
+          <a:xfrm>
+            <a:off x="6549526" y="2024585"/>
+            <a:ext cx="2137274" cy="2137274"/>
+          </a:xfrm>
+          <a:prstGeom prst="rect">
+            <a:avLst/>
+          </a:prstGeom>
+        </p:spPr>
+      </p:pic>
+      <p:pic>
+        <p:nvPicPr>
+          <p:cNvPr id="5" name="Picture 4" descr="imgres.png"/>
+          <p:cNvPicPr>
+            <a:picLocks noChangeAspect="1"/>
+          </p:cNvPicPr>
+          <p:nvPr/>
+        </p:nvPicPr>
+        <p:blipFill>
+          <a:blip r:embed="rId3">
+            <a:extLst>
+              <a:ext uri="{28A0092B-C50C-407E-A947-70E740481C1C}">
+                <a14:useLocalDpi xmlns:a14="http://schemas.microsoft.com/office/drawing/2010/main" val="0"/>
+              </a:ext>
+            </a:extLst>
+          </a:blip>
+          <a:stretch>
+            <a:fillRect/>
+          </a:stretch>
+        </p:blipFill>
+        <p:spPr>
+          <a:xfrm>
+            <a:off x="6349716" y="5004090"/>
+            <a:ext cx="2647751" cy="1106409"/>
+          </a:xfrm>
+          <a:prstGeom prst="rect">
+            <a:avLst/>
+          </a:prstGeom>
+        </p:spPr>
+      </p:pic>
+    </p:spTree>
+    <p:extLst>
+      <p:ext uri="{BB962C8B-B14F-4D97-AF65-F5344CB8AC3E}">
+        <p14:creationId xmlns:p14="http://schemas.microsoft.com/office/powerpoint/2010/main" val="891799924"/>
+      </p:ext>
+    </p:extLst>
+  </p:cSld>
+  <p:clrMapOvr>
+    <a:masterClrMapping/>
+  </p:clrMapOvr>
+  <p:timing>
+    <p:tnLst>
+      <p:par>
+        <p:cTn xmlns:p14="http://schemas.microsoft.com/office/powerpoint/2010/main" id="1" dur="indefinite" restart="never" nodeType="tmRoot"/>
+      </p:par>
+    </p:tnLst>
+  </p:timing>
+</p:sld>
+</file>
+
+<file path=ppt/slides/slide7.xml><?xml version="1.0" encoding="utf-8"?>
 <p:sld xmlns:a="http://schemas.openxmlformats.org/drawingml/2006/main" xmlns:r="http://schemas.openxmlformats.org/officeDocument/2006/relationships" xmlns:p="http://schemas.openxmlformats.org/presentationml/2006/main">
   <p:cSld>
     <p:spTree>
@@ -4935,7 +5278,7 @@
 </p:sld>
 </file>
 
-<file path=ppt/slides/slide7.xml><?xml version="1.0" encoding="utf-8"?>
+<file path=ppt/slides/slide8.xml><?xml version="1.0" encoding="utf-8"?>
 <p:sld xmlns:a="http://schemas.openxmlformats.org/drawingml/2006/main" xmlns:r="http://schemas.openxmlformats.org/officeDocument/2006/relationships" xmlns:p="http://schemas.openxmlformats.org/presentationml/2006/main">
   <p:cSld>
     <p:spTree>
@@ -5095,7 +5438,7 @@
 </p:sld>
 </file>
 
-<file path=ppt/slides/slide8.xml><?xml version="1.0" encoding="utf-8"?>
+<file path=ppt/slides/slide9.xml><?xml version="1.0" encoding="utf-8"?>
 <p:sld xmlns:a="http://schemas.openxmlformats.org/drawingml/2006/main" xmlns:r="http://schemas.openxmlformats.org/officeDocument/2006/relationships" xmlns:p="http://schemas.openxmlformats.org/presentationml/2006/main">
   <p:cSld>
     <p:spTree>
@@ -5199,125 +5542,6 @@
     <p:extLst>
       <p:ext uri="{BB962C8B-B14F-4D97-AF65-F5344CB8AC3E}">
         <p14:creationId xmlns:p14="http://schemas.microsoft.com/office/powerpoint/2010/main" val="631733834"/>
-      </p:ext>
-    </p:extLst>
-  </p:cSld>
-  <p:clrMapOvr>
-    <a:masterClrMapping/>
-  </p:clrMapOvr>
-  <p:timing>
-    <p:tnLst>
-      <p:par>
-        <p:cTn xmlns:p14="http://schemas.microsoft.com/office/powerpoint/2010/main" id="1" dur="indefinite" restart="never" nodeType="tmRoot"/>
-      </p:par>
-    </p:tnLst>
-  </p:timing>
-</p:sld>
-</file>
-
-<file path=ppt/slides/slide9.xml><?xml version="1.0" encoding="utf-8"?>
-<p:sld xmlns:a="http://schemas.openxmlformats.org/drawingml/2006/main" xmlns:r="http://schemas.openxmlformats.org/officeDocument/2006/relationships" xmlns:p="http://schemas.openxmlformats.org/presentationml/2006/main">
-  <p:cSld>
-    <p:spTree>
-      <p:nvGrpSpPr>
-        <p:cNvPr id="1" name=""/>
-        <p:cNvGrpSpPr/>
-        <p:nvPr/>
-      </p:nvGrpSpPr>
-      <p:grpSpPr>
-        <a:xfrm>
-          <a:off x="0" y="0"/>
-          <a:ext cx="0" cy="0"/>
-          <a:chOff x="0" y="0"/>
-          <a:chExt cx="0" cy="0"/>
-        </a:xfrm>
-      </p:grpSpPr>
-      <p:sp>
-        <p:nvSpPr>
-          <p:cNvPr id="2" name="Title 1"/>
-          <p:cNvSpPr>
-            <a:spLocks noGrp="1"/>
-          </p:cNvSpPr>
-          <p:nvPr>
-            <p:ph type="title"/>
-          </p:nvPr>
-        </p:nvSpPr>
-        <p:spPr/>
-        <p:txBody>
-          <a:bodyPr/>
-          <a:lstStyle/>
-          <a:p>
-            <a:r>
-              <a:rPr lang="en-US" dirty="0" smtClean="0"/>
-              <a:t>Results</a:t>
-            </a:r>
-            <a:endParaRPr lang="en-US" dirty="0"/>
-          </a:p>
-        </p:txBody>
-      </p:sp>
-      <p:pic>
-        <p:nvPicPr>
-          <p:cNvPr id="4" name="Picture 3" descr="Screen Shot 2016-05-03 at 3.02.27 PM.png"/>
-          <p:cNvPicPr>
-            <a:picLocks noChangeAspect="1"/>
-          </p:cNvPicPr>
-          <p:nvPr/>
-        </p:nvPicPr>
-        <p:blipFill>
-          <a:blip r:embed="rId2">
-            <a:extLst>
-              <a:ext uri="{28A0092B-C50C-407E-A947-70E740481C1C}">
-                <a14:useLocalDpi xmlns:a14="http://schemas.microsoft.com/office/drawing/2010/main" val="0"/>
-              </a:ext>
-            </a:extLst>
-          </a:blip>
-          <a:stretch>
-            <a:fillRect/>
-          </a:stretch>
-        </p:blipFill>
-        <p:spPr>
-          <a:xfrm>
-            <a:off x="0" y="2637378"/>
-            <a:ext cx="9144000" cy="3337425"/>
-          </a:xfrm>
-          <a:prstGeom prst="rect">
-            <a:avLst/>
-          </a:prstGeom>
-        </p:spPr>
-      </p:pic>
-      <p:sp>
-        <p:nvSpPr>
-          <p:cNvPr id="5" name="TextBox 4"/>
-          <p:cNvSpPr txBox="1"/>
-          <p:nvPr/>
-        </p:nvSpPr>
-        <p:spPr>
-          <a:xfrm>
-            <a:off x="457199" y="1535442"/>
-            <a:ext cx="5224983" cy="523220"/>
-          </a:xfrm>
-          <a:prstGeom prst="rect">
-            <a:avLst/>
-          </a:prstGeom>
-          <a:noFill/>
-        </p:spPr>
-        <p:txBody>
-          <a:bodyPr wrap="square" rtlCol="0">
-            <a:spAutoFit/>
-          </a:bodyPr>
-          <a:lstStyle/>
-          <a:p>
-            <a:r>
-              <a:rPr lang="en-US" sz="2800" dirty="0" smtClean="0"/>
-              <a:t>Neural Network Performance</a:t>
-            </a:r>
-          </a:p>
-        </p:txBody>
-      </p:sp>
-    </p:spTree>
-    <p:extLst>
-      <p:ext uri="{BB962C8B-B14F-4D97-AF65-F5344CB8AC3E}">
-        <p14:creationId xmlns:p14="http://schemas.microsoft.com/office/powerpoint/2010/main" val="3568103725"/>
       </p:ext>
     </p:extLst>
   </p:cSld>

</xml_diff>

<commit_message>
wrap up content of the presentation and add some graphs
</commit_message>
<xml_diff>
--- a/presentation.pptx
+++ b/presentation.pptx
@@ -5,7 +5,7 @@
     <p:sldMasterId id="2147483960" r:id="rId1"/>
   </p:sldMasterIdLst>
   <p:notesMasterIdLst>
-    <p:notesMasterId r:id="rId12"/>
+    <p:notesMasterId r:id="rId14"/>
   </p:notesMasterIdLst>
   <p:sldIdLst>
     <p:sldId id="256" r:id="rId2"/>
@@ -14,10 +14,12 @@
     <p:sldId id="259" r:id="rId5"/>
     <p:sldId id="260" r:id="rId6"/>
     <p:sldId id="265" r:id="rId7"/>
-    <p:sldId id="261" r:id="rId8"/>
-    <p:sldId id="262" r:id="rId9"/>
-    <p:sldId id="263" r:id="rId10"/>
-    <p:sldId id="264" r:id="rId11"/>
+    <p:sldId id="266" r:id="rId8"/>
+    <p:sldId id="267" r:id="rId9"/>
+    <p:sldId id="261" r:id="rId10"/>
+    <p:sldId id="262" r:id="rId11"/>
+    <p:sldId id="263" r:id="rId12"/>
+    <p:sldId id="264" r:id="rId13"/>
   </p:sldIdLst>
   <p:sldSz cx="9144000" cy="6858000" type="screen4x3"/>
   <p:notesSz cx="6858000" cy="9144000"/>
@@ -127,6 +129,8 @@
             <p14:sldId id="259"/>
             <p14:sldId id="260"/>
             <p14:sldId id="265"/>
+            <p14:sldId id="266"/>
+            <p14:sldId id="267"/>
             <p14:sldId id="261"/>
             <p14:sldId id="262"/>
             <p14:sldId id="263"/>
@@ -3924,6 +3928,286 @@
           <a:p>
             <a:r>
               <a:rPr lang="en-US" dirty="0" smtClean="0"/>
+              <a:t>Feature Selection </a:t>
+            </a:r>
+            <a:endParaRPr lang="en-US" dirty="0"/>
+          </a:p>
+        </p:txBody>
+      </p:sp>
+      <p:sp>
+        <p:nvSpPr>
+          <p:cNvPr id="5" name="Content Placeholder 4"/>
+          <p:cNvSpPr>
+            <a:spLocks noGrp="1"/>
+          </p:cNvSpPr>
+          <p:nvPr>
+            <p:ph idx="1"/>
+          </p:nvPr>
+        </p:nvSpPr>
+        <p:spPr>
+          <a:xfrm>
+            <a:off x="464060" y="4493312"/>
+            <a:ext cx="8222740" cy="2100136"/>
+          </a:xfrm>
+        </p:spPr>
+        <p:txBody>
+          <a:bodyPr>
+            <a:normAutofit fontScale="92500" lnSpcReduction="20000"/>
+          </a:bodyPr>
+          <a:lstStyle/>
+          <a:p>
+            <a:pPr marL="0" indent="0">
+              <a:buNone/>
+            </a:pPr>
+            <a:r>
+              <a:rPr lang="en-US" b="1" dirty="0" smtClean="0"/>
+              <a:t>Final Model</a:t>
+            </a:r>
+          </a:p>
+          <a:p>
+            <a:pPr marL="0" indent="0">
+              <a:buNone/>
+            </a:pPr>
+            <a:r>
+              <a:rPr lang="en-US" dirty="0">
+                <a:latin typeface="Andale Mono"/>
+                <a:cs typeface="Andale Mono"/>
+              </a:rPr>
+              <a:t>Target ~ character count, preposition count, char per word, has a number</a:t>
+            </a:r>
+          </a:p>
+          <a:p>
+            <a:pPr marL="0" indent="0">
+              <a:buNone/>
+            </a:pPr>
+            <a:endParaRPr lang="en-US" dirty="0"/>
+          </a:p>
+          <a:p>
+            <a:pPr marL="0" indent="0">
+              <a:buNone/>
+            </a:pPr>
+            <a:r>
+              <a:rPr lang="en-US" dirty="0" smtClean="0"/>
+              <a:t>Target = (</a:t>
+            </a:r>
+            <a:r>
+              <a:rPr lang="en-US" sz="1800" dirty="0" smtClean="0">
+                <a:latin typeface="Andale Mono"/>
+                <a:cs typeface="Andale Mono"/>
+              </a:rPr>
+              <a:t>Computers, Entertainment, Information, Living, Online Community, Shopping, Sports</a:t>
+            </a:r>
+            <a:r>
+              <a:rPr lang="en-US" dirty="0" smtClean="0"/>
+              <a:t>)</a:t>
+            </a:r>
+          </a:p>
+        </p:txBody>
+      </p:sp>
+      <p:pic>
+        <p:nvPicPr>
+          <p:cNvPr id="6" name="Picture 5" descr="Screen Shot 2016-05-03 at 1.02.05 PM.png"/>
+          <p:cNvPicPr>
+            <a:picLocks noChangeAspect="1"/>
+          </p:cNvPicPr>
+          <p:nvPr/>
+        </p:nvPicPr>
+        <p:blipFill>
+          <a:blip r:embed="rId2">
+            <a:extLst>
+              <a:ext uri="{28A0092B-C50C-407E-A947-70E740481C1C}">
+                <a14:useLocalDpi xmlns:a14="http://schemas.microsoft.com/office/drawing/2010/main" val="0"/>
+              </a:ext>
+            </a:extLst>
+          </a:blip>
+          <a:stretch>
+            <a:fillRect/>
+          </a:stretch>
+        </p:blipFill>
+        <p:spPr>
+          <a:xfrm>
+            <a:off x="457201" y="1502519"/>
+            <a:ext cx="4964482" cy="2696067"/>
+          </a:xfrm>
+          <a:prstGeom prst="rect">
+            <a:avLst/>
+          </a:prstGeom>
+        </p:spPr>
+      </p:pic>
+    </p:spTree>
+    <p:extLst>
+      <p:ext uri="{BB962C8B-B14F-4D97-AF65-F5344CB8AC3E}">
+        <p14:creationId xmlns:p14="http://schemas.microsoft.com/office/powerpoint/2010/main" val="2494718803"/>
+      </p:ext>
+    </p:extLst>
+  </p:cSld>
+  <p:clrMapOvr>
+    <a:masterClrMapping/>
+  </p:clrMapOvr>
+  <p:timing>
+    <p:tnLst>
+      <p:par>
+        <p:cTn xmlns:p14="http://schemas.microsoft.com/office/powerpoint/2010/main" id="1" dur="indefinite" restart="never" nodeType="tmRoot"/>
+      </p:par>
+    </p:tnLst>
+  </p:timing>
+</p:sld>
+</file>
+
+<file path=ppt/slides/slide11.xml><?xml version="1.0" encoding="utf-8"?>
+<p:sld xmlns:a="http://schemas.openxmlformats.org/drawingml/2006/main" xmlns:r="http://schemas.openxmlformats.org/officeDocument/2006/relationships" xmlns:p="http://schemas.openxmlformats.org/presentationml/2006/main">
+  <p:cSld>
+    <p:spTree>
+      <p:nvGrpSpPr>
+        <p:cNvPr id="1" name=""/>
+        <p:cNvGrpSpPr/>
+        <p:nvPr/>
+      </p:nvGrpSpPr>
+      <p:grpSpPr>
+        <a:xfrm>
+          <a:off x="0" y="0"/>
+          <a:ext cx="0" cy="0"/>
+          <a:chOff x="0" y="0"/>
+          <a:chExt cx="0" cy="0"/>
+        </a:xfrm>
+      </p:grpSpPr>
+      <p:sp>
+        <p:nvSpPr>
+          <p:cNvPr id="2" name="Title 1"/>
+          <p:cNvSpPr>
+            <a:spLocks noGrp="1"/>
+          </p:cNvSpPr>
+          <p:nvPr>
+            <p:ph type="title"/>
+          </p:nvPr>
+        </p:nvSpPr>
+        <p:spPr/>
+        <p:txBody>
+          <a:bodyPr/>
+          <a:lstStyle/>
+          <a:p>
+            <a:r>
+              <a:rPr lang="en-US" dirty="0" smtClean="0"/>
+              <a:t>Results</a:t>
+            </a:r>
+            <a:endParaRPr lang="en-US" dirty="0"/>
+          </a:p>
+        </p:txBody>
+      </p:sp>
+      <p:pic>
+        <p:nvPicPr>
+          <p:cNvPr id="4" name="Picture 3" descr="Screen Shot 2016-05-03 at 3.00.17 PM.png"/>
+          <p:cNvPicPr>
+            <a:picLocks noChangeAspect="1"/>
+          </p:cNvPicPr>
+          <p:nvPr/>
+        </p:nvPicPr>
+        <p:blipFill>
+          <a:blip r:embed="rId2">
+            <a:extLst>
+              <a:ext uri="{28A0092B-C50C-407E-A947-70E740481C1C}">
+                <a14:useLocalDpi xmlns:a14="http://schemas.microsoft.com/office/drawing/2010/main" val="0"/>
+              </a:ext>
+            </a:extLst>
+          </a:blip>
+          <a:stretch>
+            <a:fillRect/>
+          </a:stretch>
+        </p:blipFill>
+        <p:spPr>
+          <a:xfrm>
+            <a:off x="0" y="2303766"/>
+            <a:ext cx="9144000" cy="3540796"/>
+          </a:xfrm>
+          <a:prstGeom prst="rect">
+            <a:avLst/>
+          </a:prstGeom>
+        </p:spPr>
+      </p:pic>
+      <p:sp>
+        <p:nvSpPr>
+          <p:cNvPr id="5" name="TextBox 4"/>
+          <p:cNvSpPr txBox="1"/>
+          <p:nvPr/>
+        </p:nvSpPr>
+        <p:spPr>
+          <a:xfrm>
+            <a:off x="457200" y="1540280"/>
+            <a:ext cx="4535266" cy="523220"/>
+          </a:xfrm>
+          <a:prstGeom prst="rect">
+            <a:avLst/>
+          </a:prstGeom>
+          <a:noFill/>
+        </p:spPr>
+        <p:txBody>
+          <a:bodyPr wrap="none" rtlCol="0">
+            <a:spAutoFit/>
+          </a:bodyPr>
+          <a:lstStyle/>
+          <a:p>
+            <a:r>
+              <a:rPr lang="en-US" sz="2800" dirty="0" smtClean="0"/>
+              <a:t>Decision Tree Performance</a:t>
+            </a:r>
+            <a:endParaRPr lang="en-US" sz="2800" dirty="0"/>
+          </a:p>
+        </p:txBody>
+      </p:sp>
+    </p:spTree>
+    <p:extLst>
+      <p:ext uri="{BB962C8B-B14F-4D97-AF65-F5344CB8AC3E}">
+        <p14:creationId xmlns:p14="http://schemas.microsoft.com/office/powerpoint/2010/main" val="631733834"/>
+      </p:ext>
+    </p:extLst>
+  </p:cSld>
+  <p:clrMapOvr>
+    <a:masterClrMapping/>
+  </p:clrMapOvr>
+  <p:timing>
+    <p:tnLst>
+      <p:par>
+        <p:cTn xmlns:p14="http://schemas.microsoft.com/office/powerpoint/2010/main" id="1" dur="indefinite" restart="never" nodeType="tmRoot"/>
+      </p:par>
+    </p:tnLst>
+  </p:timing>
+</p:sld>
+</file>
+
+<file path=ppt/slides/slide12.xml><?xml version="1.0" encoding="utf-8"?>
+<p:sld xmlns:a="http://schemas.openxmlformats.org/drawingml/2006/main" xmlns:r="http://schemas.openxmlformats.org/officeDocument/2006/relationships" xmlns:p="http://schemas.openxmlformats.org/presentationml/2006/main">
+  <p:cSld>
+    <p:spTree>
+      <p:nvGrpSpPr>
+        <p:cNvPr id="1" name=""/>
+        <p:cNvGrpSpPr/>
+        <p:nvPr/>
+      </p:nvGrpSpPr>
+      <p:grpSpPr>
+        <a:xfrm>
+          <a:off x="0" y="0"/>
+          <a:ext cx="0" cy="0"/>
+          <a:chOff x="0" y="0"/>
+          <a:chExt cx="0" cy="0"/>
+        </a:xfrm>
+      </p:grpSpPr>
+      <p:sp>
+        <p:nvSpPr>
+          <p:cNvPr id="2" name="Title 1"/>
+          <p:cNvSpPr>
+            <a:spLocks noGrp="1"/>
+          </p:cNvSpPr>
+          <p:nvPr>
+            <p:ph type="title"/>
+          </p:nvPr>
+        </p:nvSpPr>
+        <p:spPr/>
+        <p:txBody>
+          <a:bodyPr/>
+          <a:lstStyle/>
+          <a:p>
+            <a:r>
+              <a:rPr lang="en-US" dirty="0" smtClean="0"/>
               <a:t>Results</a:t>
             </a:r>
             <a:endParaRPr lang="en-US" dirty="0"/>
@@ -4236,7 +4520,7 @@
             </a:pPr>
             <a:r>
               <a:rPr lang="en-US" dirty="0" smtClean="0"/>
-              <a:t>Web queries are often short (between 3 and 5 words)</a:t>
+              <a:t>Web queries are often short (between 1 and 5 words)</a:t>
             </a:r>
           </a:p>
           <a:p>
@@ -4800,6 +5084,367 @@
 </file>
 
 <file path=ppt/slides/slide7.xml><?xml version="1.0" encoding="utf-8"?>
+<p:sld xmlns:a="http://schemas.openxmlformats.org/drawingml/2006/main" xmlns:r="http://schemas.openxmlformats.org/officeDocument/2006/relationships" xmlns:p="http://schemas.openxmlformats.org/presentationml/2006/main">
+  <p:cSld>
+    <p:spTree>
+      <p:nvGrpSpPr>
+        <p:cNvPr id="1" name=""/>
+        <p:cNvGrpSpPr/>
+        <p:nvPr/>
+      </p:nvGrpSpPr>
+      <p:grpSpPr>
+        <a:xfrm>
+          <a:off x="0" y="0"/>
+          <a:ext cx="0" cy="0"/>
+          <a:chOff x="0" y="0"/>
+          <a:chExt cx="0" cy="0"/>
+        </a:xfrm>
+      </p:grpSpPr>
+      <p:sp>
+        <p:nvSpPr>
+          <p:cNvPr id="7" name="Text Placeholder 6"/>
+          <p:cNvSpPr>
+            <a:spLocks noGrp="1"/>
+          </p:cNvSpPr>
+          <p:nvPr>
+            <p:ph type="body" idx="1"/>
+          </p:nvPr>
+        </p:nvSpPr>
+        <p:spPr/>
+        <p:txBody>
+          <a:bodyPr/>
+          <a:lstStyle/>
+          <a:p>
+            <a:r>
+              <a:rPr lang="en-US" dirty="0" smtClean="0"/>
+              <a:t>Number of Words per Query</a:t>
+            </a:r>
+            <a:endParaRPr lang="en-US" dirty="0"/>
+          </a:p>
+        </p:txBody>
+      </p:sp>
+      <p:sp>
+        <p:nvSpPr>
+          <p:cNvPr id="9" name="Text Placeholder 8"/>
+          <p:cNvSpPr>
+            <a:spLocks noGrp="1"/>
+          </p:cNvSpPr>
+          <p:nvPr>
+            <p:ph type="body" sz="quarter" idx="3"/>
+          </p:nvPr>
+        </p:nvSpPr>
+        <p:spPr/>
+        <p:txBody>
+          <a:bodyPr>
+            <a:normAutofit fontScale="92500" lnSpcReduction="10000"/>
+          </a:bodyPr>
+          <a:lstStyle/>
+          <a:p>
+            <a:r>
+              <a:rPr lang="en-US" dirty="0" smtClean="0"/>
+              <a:t>Number of Meanings Assigned to Query</a:t>
+            </a:r>
+            <a:endParaRPr lang="en-US" dirty="0"/>
+          </a:p>
+        </p:txBody>
+      </p:sp>
+      <p:pic>
+        <p:nvPicPr>
+          <p:cNvPr id="4" name="Picture 3" descr="meaning_count_bar.png"/>
+          <p:cNvPicPr>
+            <a:picLocks noChangeAspect="1"/>
+          </p:cNvPicPr>
+          <p:nvPr/>
+        </p:nvPicPr>
+        <p:blipFill>
+          <a:blip r:embed="rId2">
+            <a:extLst>
+              <a:ext uri="{28A0092B-C50C-407E-A947-70E740481C1C}">
+                <a14:useLocalDpi xmlns:a14="http://schemas.microsoft.com/office/drawing/2010/main" val="0"/>
+              </a:ext>
+            </a:extLst>
+          </a:blip>
+          <a:stretch>
+            <a:fillRect/>
+          </a:stretch>
+        </p:blipFill>
+        <p:spPr>
+          <a:xfrm>
+            <a:off x="4754880" y="2554817"/>
+            <a:ext cx="3931920" cy="2697876"/>
+          </a:xfrm>
+          <a:prstGeom prst="rect">
+            <a:avLst/>
+          </a:prstGeom>
+        </p:spPr>
+      </p:pic>
+      <p:pic>
+        <p:nvPicPr>
+          <p:cNvPr id="5" name="Picture 4" descr="word_count_bar.png"/>
+          <p:cNvPicPr>
+            <a:picLocks noChangeAspect="1"/>
+          </p:cNvPicPr>
+          <p:nvPr/>
+        </p:nvPicPr>
+        <p:blipFill>
+          <a:blip r:embed="rId3">
+            <a:extLst>
+              <a:ext uri="{28A0092B-C50C-407E-A947-70E740481C1C}">
+                <a14:useLocalDpi xmlns:a14="http://schemas.microsoft.com/office/drawing/2010/main" val="0"/>
+              </a:ext>
+            </a:extLst>
+          </a:blip>
+          <a:stretch>
+            <a:fillRect/>
+          </a:stretch>
+        </p:blipFill>
+        <p:spPr>
+          <a:xfrm>
+            <a:off x="457200" y="2554817"/>
+            <a:ext cx="3931920" cy="2697876"/>
+          </a:xfrm>
+          <a:prstGeom prst="rect">
+            <a:avLst/>
+          </a:prstGeom>
+        </p:spPr>
+      </p:pic>
+      <p:sp>
+        <p:nvSpPr>
+          <p:cNvPr id="11" name="TextBox 10"/>
+          <p:cNvSpPr txBox="1"/>
+          <p:nvPr/>
+        </p:nvSpPr>
+        <p:spPr>
+          <a:xfrm>
+            <a:off x="862910" y="5342315"/>
+            <a:ext cx="3526210" cy="646331"/>
+          </a:xfrm>
+          <a:prstGeom prst="rect">
+            <a:avLst/>
+          </a:prstGeom>
+          <a:noFill/>
+        </p:spPr>
+        <p:txBody>
+          <a:bodyPr wrap="square" rtlCol="0">
+            <a:spAutoFit/>
+          </a:bodyPr>
+          <a:lstStyle/>
+          <a:p>
+            <a:r>
+              <a:rPr lang="en-US" dirty="0" smtClean="0"/>
+              <a:t>Mean: 	</a:t>
+            </a:r>
+            <a:r>
+              <a:rPr lang="fi-FI" dirty="0" smtClean="0"/>
+              <a:t>2.53875</a:t>
+            </a:r>
+          </a:p>
+          <a:p>
+            <a:r>
+              <a:rPr lang="fi-FI" dirty="0" smtClean="0"/>
+              <a:t>Median: 	2</a:t>
+            </a:r>
+            <a:r>
+              <a:rPr lang="en-US" dirty="0" smtClean="0"/>
+              <a:t> </a:t>
+            </a:r>
+            <a:endParaRPr lang="en-US" dirty="0"/>
+          </a:p>
+        </p:txBody>
+      </p:sp>
+      <p:sp>
+        <p:nvSpPr>
+          <p:cNvPr id="12" name="TextBox 11"/>
+          <p:cNvSpPr txBox="1"/>
+          <p:nvPr/>
+        </p:nvSpPr>
+        <p:spPr>
+          <a:xfrm>
+            <a:off x="5063492" y="5342315"/>
+            <a:ext cx="3623307" cy="646331"/>
+          </a:xfrm>
+          <a:prstGeom prst="rect">
+            <a:avLst/>
+          </a:prstGeom>
+          <a:noFill/>
+        </p:spPr>
+        <p:txBody>
+          <a:bodyPr wrap="square" rtlCol="0">
+            <a:spAutoFit/>
+          </a:bodyPr>
+          <a:lstStyle/>
+          <a:p>
+            <a:r>
+              <a:rPr lang="en-US" dirty="0" smtClean="0"/>
+              <a:t>Mean: 	</a:t>
+            </a:r>
+            <a:r>
+              <a:rPr lang="nb-NO" dirty="0" smtClean="0"/>
+              <a:t>3.302917</a:t>
+            </a:r>
+          </a:p>
+          <a:p>
+            <a:r>
+              <a:rPr lang="nb-NO" dirty="0" smtClean="0"/>
+              <a:t>Median: 	</a:t>
+            </a:r>
+            <a:r>
+              <a:rPr lang="en-US" dirty="0" smtClean="0"/>
+              <a:t>3</a:t>
+            </a:r>
+            <a:endParaRPr lang="en-US" dirty="0"/>
+          </a:p>
+        </p:txBody>
+      </p:sp>
+    </p:spTree>
+    <p:extLst>
+      <p:ext uri="{BB962C8B-B14F-4D97-AF65-F5344CB8AC3E}">
+        <p14:creationId xmlns:p14="http://schemas.microsoft.com/office/powerpoint/2010/main" val="2246040449"/>
+      </p:ext>
+    </p:extLst>
+  </p:cSld>
+  <p:clrMapOvr>
+    <a:masterClrMapping/>
+  </p:clrMapOvr>
+</p:sld>
+</file>
+
+<file path=ppt/slides/slide8.xml><?xml version="1.0" encoding="utf-8"?>
+<p:sld xmlns:a="http://schemas.openxmlformats.org/drawingml/2006/main" xmlns:r="http://schemas.openxmlformats.org/officeDocument/2006/relationships" xmlns:p="http://schemas.openxmlformats.org/presentationml/2006/main">
+  <p:cSld>
+    <p:spTree>
+      <p:nvGrpSpPr>
+        <p:cNvPr id="1" name=""/>
+        <p:cNvGrpSpPr/>
+        <p:nvPr/>
+      </p:nvGrpSpPr>
+      <p:grpSpPr>
+        <a:xfrm>
+          <a:off x="0" y="0"/>
+          <a:ext cx="0" cy="0"/>
+          <a:chOff x="0" y="0"/>
+          <a:chExt cx="0" cy="0"/>
+        </a:xfrm>
+      </p:grpSpPr>
+      <p:sp>
+        <p:nvSpPr>
+          <p:cNvPr id="7" name="Title 6"/>
+          <p:cNvSpPr>
+            <a:spLocks noGrp="1"/>
+          </p:cNvSpPr>
+          <p:nvPr>
+            <p:ph type="title"/>
+          </p:nvPr>
+        </p:nvSpPr>
+        <p:spPr/>
+        <p:txBody>
+          <a:bodyPr/>
+          <a:lstStyle/>
+          <a:p>
+            <a:r>
+              <a:rPr lang="en-US" dirty="0" smtClean="0"/>
+              <a:t>Preprocessing</a:t>
+            </a:r>
+            <a:endParaRPr lang="en-US" dirty="0"/>
+          </a:p>
+        </p:txBody>
+      </p:sp>
+      <p:sp>
+        <p:nvSpPr>
+          <p:cNvPr id="8" name="Content Placeholder 7"/>
+          <p:cNvSpPr>
+            <a:spLocks noGrp="1"/>
+          </p:cNvSpPr>
+          <p:nvPr>
+            <p:ph idx="1"/>
+          </p:nvPr>
+        </p:nvSpPr>
+        <p:spPr/>
+        <p:txBody>
+          <a:bodyPr/>
+          <a:lstStyle/>
+          <a:p>
+            <a:r>
+              <a:rPr lang="en-US" dirty="0" smtClean="0"/>
+              <a:t>Extract super-categories assigned to each query</a:t>
+            </a:r>
+          </a:p>
+          <a:p>
+            <a:pPr lvl="1"/>
+            <a:r>
+              <a:rPr lang="en-US" dirty="0" smtClean="0"/>
+              <a:t>Remember, those were (</a:t>
+            </a:r>
+            <a:r>
+              <a:rPr lang="en-US" dirty="0">
+                <a:latin typeface="Andale Mono"/>
+                <a:cs typeface="Andale Mono"/>
+              </a:rPr>
+              <a:t>Computers, Entertainment, Information, Living, Online Community, Shopping, </a:t>
+            </a:r>
+            <a:r>
+              <a:rPr lang="en-US" dirty="0" smtClean="0">
+                <a:latin typeface="Andale Mono"/>
+                <a:cs typeface="Andale Mono"/>
+              </a:rPr>
+              <a:t>Sports</a:t>
+            </a:r>
+            <a:r>
+              <a:rPr lang="en-US" dirty="0" smtClean="0"/>
+              <a:t>)</a:t>
+            </a:r>
+          </a:p>
+          <a:p>
+            <a:r>
+              <a:rPr lang="en-US" dirty="0" smtClean="0"/>
+              <a:t>Then create separate columns for each category (7 new columns)</a:t>
+            </a:r>
+          </a:p>
+          <a:p>
+            <a:r>
+              <a:rPr lang="en-US" dirty="0" smtClean="0"/>
+              <a:t>Assign</a:t>
+            </a:r>
+            <a:r>
+              <a:rPr lang="en-US" dirty="0" smtClean="0">
+                <a:latin typeface="Andale Mono"/>
+                <a:cs typeface="Andale Mono"/>
+              </a:rPr>
+              <a:t> true </a:t>
+            </a:r>
+            <a:r>
+              <a:rPr lang="en-US" dirty="0" smtClean="0"/>
+              <a:t>for that column where the query is classified as such and a </a:t>
+            </a:r>
+            <a:r>
+              <a:rPr lang="en-US" dirty="0" smtClean="0">
+                <a:latin typeface="Andale Mono"/>
+                <a:cs typeface="Andale Mono"/>
+              </a:rPr>
+              <a:t>false</a:t>
+            </a:r>
+            <a:r>
+              <a:rPr lang="en-US" dirty="0" smtClean="0"/>
+              <a:t> otherwise</a:t>
+            </a:r>
+            <a:endParaRPr lang="en-US" dirty="0"/>
+          </a:p>
+        </p:txBody>
+      </p:sp>
+    </p:spTree>
+    <p:extLst>
+      <p:ext uri="{BB962C8B-B14F-4D97-AF65-F5344CB8AC3E}">
+        <p14:creationId xmlns:p14="http://schemas.microsoft.com/office/powerpoint/2010/main" val="717197135"/>
+      </p:ext>
+    </p:extLst>
+  </p:cSld>
+  <p:clrMapOvr>
+    <a:masterClrMapping/>
+  </p:clrMapOvr>
+</p:sld>
+</file>
+
+<file path=ppt/slides/slide9.xml><?xml version="1.0" encoding="utf-8"?>
 <p:sld xmlns:a="http://schemas.openxmlformats.org/drawingml/2006/main" xmlns:r="http://schemas.openxmlformats.org/officeDocument/2006/relationships" xmlns:p="http://schemas.openxmlformats.org/presentationml/2006/main">
   <p:cSld>
     <p:spTree>
@@ -5262,286 +5907,6 @@
     <p:extLst>
       <p:ext uri="{BB962C8B-B14F-4D97-AF65-F5344CB8AC3E}">
         <p14:creationId xmlns:p14="http://schemas.microsoft.com/office/powerpoint/2010/main" val="37337337"/>
-      </p:ext>
-    </p:extLst>
-  </p:cSld>
-  <p:clrMapOvr>
-    <a:masterClrMapping/>
-  </p:clrMapOvr>
-  <p:timing>
-    <p:tnLst>
-      <p:par>
-        <p:cTn xmlns:p14="http://schemas.microsoft.com/office/powerpoint/2010/main" id="1" dur="indefinite" restart="never" nodeType="tmRoot"/>
-      </p:par>
-    </p:tnLst>
-  </p:timing>
-</p:sld>
-</file>
-
-<file path=ppt/slides/slide8.xml><?xml version="1.0" encoding="utf-8"?>
-<p:sld xmlns:a="http://schemas.openxmlformats.org/drawingml/2006/main" xmlns:r="http://schemas.openxmlformats.org/officeDocument/2006/relationships" xmlns:p="http://schemas.openxmlformats.org/presentationml/2006/main">
-  <p:cSld>
-    <p:spTree>
-      <p:nvGrpSpPr>
-        <p:cNvPr id="1" name=""/>
-        <p:cNvGrpSpPr/>
-        <p:nvPr/>
-      </p:nvGrpSpPr>
-      <p:grpSpPr>
-        <a:xfrm>
-          <a:off x="0" y="0"/>
-          <a:ext cx="0" cy="0"/>
-          <a:chOff x="0" y="0"/>
-          <a:chExt cx="0" cy="0"/>
-        </a:xfrm>
-      </p:grpSpPr>
-      <p:sp>
-        <p:nvSpPr>
-          <p:cNvPr id="2" name="Title 1"/>
-          <p:cNvSpPr>
-            <a:spLocks noGrp="1"/>
-          </p:cNvSpPr>
-          <p:nvPr>
-            <p:ph type="title"/>
-          </p:nvPr>
-        </p:nvSpPr>
-        <p:spPr/>
-        <p:txBody>
-          <a:bodyPr/>
-          <a:lstStyle/>
-          <a:p>
-            <a:r>
-              <a:rPr lang="en-US" dirty="0" smtClean="0"/>
-              <a:t>Feature Selection </a:t>
-            </a:r>
-            <a:endParaRPr lang="en-US" dirty="0"/>
-          </a:p>
-        </p:txBody>
-      </p:sp>
-      <p:sp>
-        <p:nvSpPr>
-          <p:cNvPr id="5" name="Content Placeholder 4"/>
-          <p:cNvSpPr>
-            <a:spLocks noGrp="1"/>
-          </p:cNvSpPr>
-          <p:nvPr>
-            <p:ph idx="1"/>
-          </p:nvPr>
-        </p:nvSpPr>
-        <p:spPr>
-          <a:xfrm>
-            <a:off x="464060" y="4493312"/>
-            <a:ext cx="8222740" cy="2100136"/>
-          </a:xfrm>
-        </p:spPr>
-        <p:txBody>
-          <a:bodyPr>
-            <a:normAutofit fontScale="92500" lnSpcReduction="20000"/>
-          </a:bodyPr>
-          <a:lstStyle/>
-          <a:p>
-            <a:pPr marL="0" indent="0">
-              <a:buNone/>
-            </a:pPr>
-            <a:r>
-              <a:rPr lang="en-US" b="1" dirty="0" smtClean="0"/>
-              <a:t>Final Model</a:t>
-            </a:r>
-          </a:p>
-          <a:p>
-            <a:pPr marL="0" indent="0">
-              <a:buNone/>
-            </a:pPr>
-            <a:r>
-              <a:rPr lang="en-US" dirty="0">
-                <a:latin typeface="Andale Mono"/>
-                <a:cs typeface="Andale Mono"/>
-              </a:rPr>
-              <a:t>Target ~ character count, preposition count, char per word, has a number</a:t>
-            </a:r>
-          </a:p>
-          <a:p>
-            <a:pPr marL="0" indent="0">
-              <a:buNone/>
-            </a:pPr>
-            <a:endParaRPr lang="en-US" dirty="0"/>
-          </a:p>
-          <a:p>
-            <a:pPr marL="0" indent="0">
-              <a:buNone/>
-            </a:pPr>
-            <a:r>
-              <a:rPr lang="en-US" dirty="0" smtClean="0"/>
-              <a:t>Target = (</a:t>
-            </a:r>
-            <a:r>
-              <a:rPr lang="en-US" sz="1800" dirty="0" smtClean="0">
-                <a:latin typeface="Andale Mono"/>
-                <a:cs typeface="Andale Mono"/>
-              </a:rPr>
-              <a:t>Computers, Entertainment, Information, Living, Online Community, Shopping, Sports</a:t>
-            </a:r>
-            <a:r>
-              <a:rPr lang="en-US" dirty="0" smtClean="0"/>
-              <a:t>)</a:t>
-            </a:r>
-          </a:p>
-        </p:txBody>
-      </p:sp>
-      <p:pic>
-        <p:nvPicPr>
-          <p:cNvPr id="6" name="Picture 5" descr="Screen Shot 2016-05-03 at 1.02.05 PM.png"/>
-          <p:cNvPicPr>
-            <a:picLocks noChangeAspect="1"/>
-          </p:cNvPicPr>
-          <p:nvPr/>
-        </p:nvPicPr>
-        <p:blipFill>
-          <a:blip r:embed="rId2">
-            <a:extLst>
-              <a:ext uri="{28A0092B-C50C-407E-A947-70E740481C1C}">
-                <a14:useLocalDpi xmlns:a14="http://schemas.microsoft.com/office/drawing/2010/main" val="0"/>
-              </a:ext>
-            </a:extLst>
-          </a:blip>
-          <a:stretch>
-            <a:fillRect/>
-          </a:stretch>
-        </p:blipFill>
-        <p:spPr>
-          <a:xfrm>
-            <a:off x="457201" y="1502519"/>
-            <a:ext cx="4964482" cy="2696067"/>
-          </a:xfrm>
-          <a:prstGeom prst="rect">
-            <a:avLst/>
-          </a:prstGeom>
-        </p:spPr>
-      </p:pic>
-    </p:spTree>
-    <p:extLst>
-      <p:ext uri="{BB962C8B-B14F-4D97-AF65-F5344CB8AC3E}">
-        <p14:creationId xmlns:p14="http://schemas.microsoft.com/office/powerpoint/2010/main" val="2494718803"/>
-      </p:ext>
-    </p:extLst>
-  </p:cSld>
-  <p:clrMapOvr>
-    <a:masterClrMapping/>
-  </p:clrMapOvr>
-  <p:timing>
-    <p:tnLst>
-      <p:par>
-        <p:cTn xmlns:p14="http://schemas.microsoft.com/office/powerpoint/2010/main" id="1" dur="indefinite" restart="never" nodeType="tmRoot"/>
-      </p:par>
-    </p:tnLst>
-  </p:timing>
-</p:sld>
-</file>
-
-<file path=ppt/slides/slide9.xml><?xml version="1.0" encoding="utf-8"?>
-<p:sld xmlns:a="http://schemas.openxmlformats.org/drawingml/2006/main" xmlns:r="http://schemas.openxmlformats.org/officeDocument/2006/relationships" xmlns:p="http://schemas.openxmlformats.org/presentationml/2006/main">
-  <p:cSld>
-    <p:spTree>
-      <p:nvGrpSpPr>
-        <p:cNvPr id="1" name=""/>
-        <p:cNvGrpSpPr/>
-        <p:nvPr/>
-      </p:nvGrpSpPr>
-      <p:grpSpPr>
-        <a:xfrm>
-          <a:off x="0" y="0"/>
-          <a:ext cx="0" cy="0"/>
-          <a:chOff x="0" y="0"/>
-          <a:chExt cx="0" cy="0"/>
-        </a:xfrm>
-      </p:grpSpPr>
-      <p:sp>
-        <p:nvSpPr>
-          <p:cNvPr id="2" name="Title 1"/>
-          <p:cNvSpPr>
-            <a:spLocks noGrp="1"/>
-          </p:cNvSpPr>
-          <p:nvPr>
-            <p:ph type="title"/>
-          </p:nvPr>
-        </p:nvSpPr>
-        <p:spPr/>
-        <p:txBody>
-          <a:bodyPr/>
-          <a:lstStyle/>
-          <a:p>
-            <a:r>
-              <a:rPr lang="en-US" dirty="0" smtClean="0"/>
-              <a:t>Results</a:t>
-            </a:r>
-            <a:endParaRPr lang="en-US" dirty="0"/>
-          </a:p>
-        </p:txBody>
-      </p:sp>
-      <p:pic>
-        <p:nvPicPr>
-          <p:cNvPr id="4" name="Picture 3" descr="Screen Shot 2016-05-03 at 3.00.17 PM.png"/>
-          <p:cNvPicPr>
-            <a:picLocks noChangeAspect="1"/>
-          </p:cNvPicPr>
-          <p:nvPr/>
-        </p:nvPicPr>
-        <p:blipFill>
-          <a:blip r:embed="rId2">
-            <a:extLst>
-              <a:ext uri="{28A0092B-C50C-407E-A947-70E740481C1C}">
-                <a14:useLocalDpi xmlns:a14="http://schemas.microsoft.com/office/drawing/2010/main" val="0"/>
-              </a:ext>
-            </a:extLst>
-          </a:blip>
-          <a:stretch>
-            <a:fillRect/>
-          </a:stretch>
-        </p:blipFill>
-        <p:spPr>
-          <a:xfrm>
-            <a:off x="0" y="2303766"/>
-            <a:ext cx="9144000" cy="3540796"/>
-          </a:xfrm>
-          <a:prstGeom prst="rect">
-            <a:avLst/>
-          </a:prstGeom>
-        </p:spPr>
-      </p:pic>
-      <p:sp>
-        <p:nvSpPr>
-          <p:cNvPr id="5" name="TextBox 4"/>
-          <p:cNvSpPr txBox="1"/>
-          <p:nvPr/>
-        </p:nvSpPr>
-        <p:spPr>
-          <a:xfrm>
-            <a:off x="457200" y="1540280"/>
-            <a:ext cx="4535266" cy="523220"/>
-          </a:xfrm>
-          <a:prstGeom prst="rect">
-            <a:avLst/>
-          </a:prstGeom>
-          <a:noFill/>
-        </p:spPr>
-        <p:txBody>
-          <a:bodyPr wrap="none" rtlCol="0">
-            <a:spAutoFit/>
-          </a:bodyPr>
-          <a:lstStyle/>
-          <a:p>
-            <a:r>
-              <a:rPr lang="en-US" sz="2800" dirty="0" smtClean="0"/>
-              <a:t>Decision Tree Performance</a:t>
-            </a:r>
-            <a:endParaRPr lang="en-US" sz="2800" dirty="0"/>
-          </a:p>
-        </p:txBody>
-      </p:sp>
-    </p:spTree>
-    <p:extLst>
-      <p:ext uri="{BB962C8B-B14F-4D97-AF65-F5344CB8AC3E}">
-        <p14:creationId xmlns:p14="http://schemas.microsoft.com/office/powerpoint/2010/main" val="631733834"/>
       </p:ext>
     </p:extLst>
   </p:cSld>

</xml_diff>

<commit_message>
add some notes to the presentation
</commit_message>
<xml_diff>
--- a/presentation.pptx
+++ b/presentation.pptx
@@ -227,7 +227,7 @@
           <a:p>
             <a:fld id="{20314F4A-DE5A-5F4D-86AF-1D5A1B6C1BA3}" type="datetimeFigureOut">
               <a:rPr lang="en-US" smtClean="0"/>
-              <a:t>5/3/16</a:t>
+              <a:t>5/4/16</a:t>
             </a:fld>
             <a:endParaRPr lang="en-US"/>
           </a:p>
@@ -637,12 +637,25 @@
           <a:p>
             <a:r>
               <a:rPr lang="en-US" dirty="0" smtClean="0"/>
-              <a:t>Precision</a:t>
+              <a:t>Precision: TP/(TP/FP) percent of predictions</a:t>
             </a:r>
             <a:r>
               <a:rPr lang="en-US" baseline="0" dirty="0" smtClean="0"/>
-              <a:t> and recall</a:t>
-            </a:r>
+              <a:t> correct</a:t>
+            </a:r>
+            <a:endParaRPr lang="en-US" dirty="0" smtClean="0"/>
+          </a:p>
+          <a:p>
+            <a:r>
+              <a:rPr lang="en-US" dirty="0" smtClean="0"/>
+              <a:t>Recall: TP/(</a:t>
+            </a:r>
+            <a:r>
+              <a:rPr lang="en-US" baseline="0" dirty="0" smtClean="0"/>
+              <a:t>TP+FN) percent of positive cases caught</a:t>
+            </a:r>
+          </a:p>
+          <a:p>
             <a:endParaRPr lang="en-US" dirty="0"/>
           </a:p>
         </p:txBody>
@@ -674,6 +687,111 @@
     <p:extLst>
       <p:ext uri="{BB962C8B-B14F-4D97-AF65-F5344CB8AC3E}">
         <p14:creationId xmlns:p14="http://schemas.microsoft.com/office/powerpoint/2010/main" val="2783168290"/>
+      </p:ext>
+    </p:extLst>
+  </p:cSld>
+  <p:clrMapOvr>
+    <a:masterClrMapping/>
+  </p:clrMapOvr>
+</p:notes>
+</file>
+
+<file path=ppt/notesSlides/notesSlide3.xml><?xml version="1.0" encoding="utf-8"?>
+<p:notes xmlns:a="http://schemas.openxmlformats.org/drawingml/2006/main" xmlns:r="http://schemas.openxmlformats.org/officeDocument/2006/relationships" xmlns:p="http://schemas.openxmlformats.org/presentationml/2006/main">
+  <p:cSld>
+    <p:spTree>
+      <p:nvGrpSpPr>
+        <p:cNvPr id="1" name=""/>
+        <p:cNvGrpSpPr/>
+        <p:nvPr/>
+      </p:nvGrpSpPr>
+      <p:grpSpPr>
+        <a:xfrm>
+          <a:off x="0" y="0"/>
+          <a:ext cx="0" cy="0"/>
+          <a:chOff x="0" y="0"/>
+          <a:chExt cx="0" cy="0"/>
+        </a:xfrm>
+      </p:grpSpPr>
+      <p:sp>
+        <p:nvSpPr>
+          <p:cNvPr id="2" name="Slide Image Placeholder 1"/>
+          <p:cNvSpPr>
+            <a:spLocks noGrp="1" noRot="1" noChangeAspect="1"/>
+          </p:cNvSpPr>
+          <p:nvPr>
+            <p:ph type="sldImg"/>
+          </p:nvPr>
+        </p:nvSpPr>
+        <p:spPr/>
+      </p:sp>
+      <p:sp>
+        <p:nvSpPr>
+          <p:cNvPr id="3" name="Notes Placeholder 2"/>
+          <p:cNvSpPr>
+            <a:spLocks noGrp="1"/>
+          </p:cNvSpPr>
+          <p:nvPr>
+            <p:ph type="body" idx="1"/>
+          </p:nvPr>
+        </p:nvSpPr>
+        <p:spPr/>
+        <p:txBody>
+          <a:bodyPr/>
+          <a:lstStyle/>
+          <a:p>
+            <a:r>
+              <a:rPr lang="en-US" dirty="0" smtClean="0"/>
+              <a:t>Precision: TP/(TP/FP) percent of predictions</a:t>
+            </a:r>
+            <a:r>
+              <a:rPr lang="en-US" baseline="0" dirty="0" smtClean="0"/>
+              <a:t> correct</a:t>
+            </a:r>
+            <a:endParaRPr lang="en-US" dirty="0" smtClean="0"/>
+          </a:p>
+          <a:p>
+            <a:r>
+              <a:rPr lang="en-US" dirty="0" smtClean="0"/>
+              <a:t>Recall: TP/(</a:t>
+            </a:r>
+            <a:r>
+              <a:rPr lang="en-US" baseline="0" dirty="0" smtClean="0"/>
+              <a:t>TP+FN) percent of positive cases caught</a:t>
+            </a:r>
+          </a:p>
+          <a:p>
+            <a:endParaRPr lang="en-US" dirty="0"/>
+          </a:p>
+        </p:txBody>
+      </p:sp>
+      <p:sp>
+        <p:nvSpPr>
+          <p:cNvPr id="4" name="Slide Number Placeholder 3"/>
+          <p:cNvSpPr>
+            <a:spLocks noGrp="1"/>
+          </p:cNvSpPr>
+          <p:nvPr>
+            <p:ph type="sldNum" sz="quarter" idx="10"/>
+          </p:nvPr>
+        </p:nvSpPr>
+        <p:spPr/>
+        <p:txBody>
+          <a:bodyPr/>
+          <a:lstStyle/>
+          <a:p>
+            <a:fld id="{FF8EFE7A-F764-6C47-B644-A3645F569A8C}" type="slidenum">
+              <a:rPr lang="en-US" smtClean="0"/>
+              <a:t>12</a:t>
+            </a:fld>
+            <a:endParaRPr lang="en-US"/>
+          </a:p>
+        </p:txBody>
+      </p:sp>
+    </p:spTree>
+    <p:extLst>
+      <p:ext uri="{BB962C8B-B14F-4D97-AF65-F5344CB8AC3E}">
+        <p14:creationId xmlns:p14="http://schemas.microsoft.com/office/powerpoint/2010/main" val="328411667"/>
       </p:ext>
     </p:extLst>
   </p:cSld>
@@ -871,7 +989,7 @@
           <a:p>
             <a:fld id="{C8A432C8-69A7-458B-9684-2BFA64B31948}" type="datetime2">
               <a:rPr lang="en-US" smtClean="0"/>
-              <a:t>Tuesday, May 3, 16</a:t>
+              <a:t>Wednesday, May 4, 16</a:t>
             </a:fld>
             <a:endParaRPr lang="en-US"/>
           </a:p>
@@ -1073,7 +1191,7 @@
           <a:p>
             <a:fld id="{8CC057FC-95B6-4D89-AFDA-ABA33EE921E5}" type="datetime2">
               <a:rPr lang="en-US" smtClean="0"/>
-              <a:t>Tuesday, May 3, 16</a:t>
+              <a:t>Wednesday, May 4, 16</a:t>
             </a:fld>
             <a:endParaRPr lang="en-US"/>
           </a:p>
@@ -1250,7 +1368,7 @@
           <a:p>
             <a:fld id="{EC4549AC-EB31-477F-92A9-B1988E232878}" type="datetime2">
               <a:rPr lang="en-US" smtClean="0"/>
-              <a:t>Tuesday, May 3, 16</a:t>
+              <a:t>Wednesday, May 4, 16</a:t>
             </a:fld>
             <a:endParaRPr lang="en-US"/>
           </a:p>
@@ -1417,7 +1535,7 @@
           <a:p>
             <a:fld id="{6396A3A3-94A6-4E5B-AF39-173ACA3E61CC}" type="datetime2">
               <a:rPr lang="en-US" smtClean="0"/>
-              <a:t>Tuesday, May 3, 16</a:t>
+              <a:t>Wednesday, May 4, 16</a:t>
             </a:fld>
             <a:endParaRPr lang="en-US"/>
           </a:p>
@@ -1667,7 +1785,7 @@
           <a:p>
             <a:fld id="{9933D019-A32C-4EAD-B8E6-DBDA699692FD}" type="datetime2">
               <a:rPr lang="en-US" smtClean="0"/>
-              <a:t>Tuesday, May 3, 16</a:t>
+              <a:t>Wednesday, May 4, 16</a:t>
             </a:fld>
             <a:endParaRPr lang="en-US"/>
           </a:p>
@@ -1987,7 +2105,7 @@
           <a:p>
             <a:fld id="{CCEBA98F-560C-4997-81C4-81D4D9187EAB}" type="datetime2">
               <a:rPr lang="en-US" smtClean="0"/>
-              <a:t>Tuesday, May 3, 16</a:t>
+              <a:t>Wednesday, May 4, 16</a:t>
             </a:fld>
             <a:endParaRPr lang="en-US"/>
           </a:p>
@@ -2455,7 +2573,7 @@
           <a:p>
             <a:fld id="{150972B2-CA5C-437D-87D0-8081271A9E4B}" type="datetime2">
               <a:rPr lang="en-US" smtClean="0"/>
-              <a:t>Tuesday, May 3, 16</a:t>
+              <a:t>Wednesday, May 4, 16</a:t>
             </a:fld>
             <a:endParaRPr lang="en-US"/>
           </a:p>
@@ -2605,7 +2723,7 @@
           <a:p>
             <a:fld id="{79CD4847-11EF-4466-A8AD-85CDB7B49118}" type="datetime2">
               <a:rPr lang="en-US" smtClean="0"/>
-              <a:t>Tuesday, May 3, 16</a:t>
+              <a:t>Wednesday, May 4, 16</a:t>
             </a:fld>
             <a:endParaRPr lang="en-US"/>
           </a:p>
@@ -2697,7 +2815,7 @@
           <a:p>
             <a:fld id="{F168457A-3AB9-4880-8A0C-9F8524491207}" type="datetime2">
               <a:rPr lang="en-US" smtClean="0"/>
-              <a:t>Tuesday, May 3, 16</a:t>
+              <a:t>Wednesday, May 4, 16</a:t>
             </a:fld>
             <a:endParaRPr lang="en-US"/>
           </a:p>
@@ -2973,7 +3091,7 @@
           <a:p>
             <a:fld id="{3FE976D3-5B7F-4300-ABED-C91F1B2AE209}" type="datetime2">
               <a:rPr lang="en-US" smtClean="0"/>
-              <a:t>Tuesday, May 3, 16</a:t>
+              <a:t>Wednesday, May 4, 16</a:t>
             </a:fld>
             <a:endParaRPr lang="en-US"/>
           </a:p>
@@ -3280,7 +3398,7 @@
           <a:p>
             <a:fld id="{EBDC1E59-17DD-41CE-97CA-624A472382D4}" type="datetime2">
               <a:rPr lang="en-US" smtClean="0"/>
-              <a:t>Tuesday, May 3, 16</a:t>
+              <a:t>Wednesday, May 4, 16</a:t>
             </a:fld>
             <a:endParaRPr lang="en-US"/>
           </a:p>
@@ -3580,7 +3698,7 @@
           <a:p>
             <a:fld id="{A80CB818-7379-467D-8E76-EF9D9074A26C}" type="datetime2">
               <a:rPr lang="en-US" smtClean="0"/>
-              <a:t>Tuesday, May 3, 16</a:t>
+              <a:t>Wednesday, May 4, 16</a:t>
             </a:fld>
             <a:endParaRPr lang="en-US" dirty="0"/>
           </a:p>
@@ -4413,7 +4531,7 @@
           <p:nvPr/>
         </p:nvPicPr>
         <p:blipFill>
-          <a:blip r:embed="rId2">
+          <a:blip r:embed="rId3">
             <a:extLst>
               <a:ext uri="{28A0092B-C50C-407E-A947-70E740481C1C}">
                 <a14:useLocalDpi xmlns:a14="http://schemas.microsoft.com/office/drawing/2010/main" val="0"/>
@@ -4842,7 +4960,19 @@
             </a:pPr>
             <a:r>
               <a:rPr lang="en-US" dirty="0" smtClean="0"/>
-              <a:t>Web queries are often short (between 1 and 5 words)</a:t>
+              <a:t>Web queries are often short (between 1 </a:t>
+            </a:r>
+            <a:r>
+              <a:rPr lang="en-US" smtClean="0"/>
+              <a:t>and </a:t>
+            </a:r>
+            <a:r>
+              <a:rPr lang="en-US" smtClean="0"/>
+              <a:t>3 </a:t>
+            </a:r>
+            <a:r>
+              <a:rPr lang="en-US" dirty="0" smtClean="0"/>
+              <a:t>words)</a:t>
             </a:r>
           </a:p>
           <a:p>

</xml_diff>